<commit_message>
update project code in presentation
</commit_message>
<xml_diff>
--- a/Capstone Project Phase B-23-06-R-14.pptx
+++ b/Capstone Project Phase B-23-06-R-14.pptx
@@ -224,7 +224,7 @@
           <a:p>
             <a:fld id="{C6E5F6AF-F730-428B-91B5-680407B17A29}" type="datetimeFigureOut">
               <a:rPr lang="he-IL" smtClean="0"/>
-              <a:t>כ"ב/ניסן/תשפ"ד</a:t>
+              <a:t>כ"ג/ניסן/תשפ"ד</a:t>
             </a:fld>
             <a:endParaRPr lang="he-IL"/>
           </a:p>
@@ -2837,7 +2837,7 @@
           <a:p>
             <a:fld id="{4144BA53-574F-4A8E-8A29-419EA04C4EA2}" type="datetimeFigureOut">
               <a:rPr lang="he-IL" smtClean="0"/>
-              <a:t>כ"ב/ניסן/תשפ"ד</a:t>
+              <a:t>כ"ג/ניסן/תשפ"ד</a:t>
             </a:fld>
             <a:endParaRPr lang="he-IL"/>
           </a:p>
@@ -3035,7 +3035,7 @@
           <a:p>
             <a:fld id="{4144BA53-574F-4A8E-8A29-419EA04C4EA2}" type="datetimeFigureOut">
               <a:rPr lang="he-IL" smtClean="0"/>
-              <a:t>כ"ב/ניסן/תשפ"ד</a:t>
+              <a:t>כ"ג/ניסן/תשפ"ד</a:t>
             </a:fld>
             <a:endParaRPr lang="he-IL"/>
           </a:p>
@@ -3243,7 +3243,7 @@
           <a:p>
             <a:fld id="{4144BA53-574F-4A8E-8A29-419EA04C4EA2}" type="datetimeFigureOut">
               <a:rPr lang="he-IL" smtClean="0"/>
-              <a:t>כ"ב/ניסן/תשפ"ד</a:t>
+              <a:t>כ"ג/ניסן/תשפ"ד</a:t>
             </a:fld>
             <a:endParaRPr lang="he-IL"/>
           </a:p>
@@ -3441,7 +3441,7 @@
           <a:p>
             <a:fld id="{4144BA53-574F-4A8E-8A29-419EA04C4EA2}" type="datetimeFigureOut">
               <a:rPr lang="he-IL" smtClean="0"/>
-              <a:t>כ"ב/ניסן/תשפ"ד</a:t>
+              <a:t>כ"ג/ניסן/תשפ"ד</a:t>
             </a:fld>
             <a:endParaRPr lang="he-IL"/>
           </a:p>
@@ -3716,7 +3716,7 @@
           <a:p>
             <a:fld id="{4144BA53-574F-4A8E-8A29-419EA04C4EA2}" type="datetimeFigureOut">
               <a:rPr lang="he-IL" smtClean="0"/>
-              <a:t>כ"ב/ניסן/תשפ"ד</a:t>
+              <a:t>כ"ג/ניסן/תשפ"ד</a:t>
             </a:fld>
             <a:endParaRPr lang="he-IL"/>
           </a:p>
@@ -3981,7 +3981,7 @@
           <a:p>
             <a:fld id="{4144BA53-574F-4A8E-8A29-419EA04C4EA2}" type="datetimeFigureOut">
               <a:rPr lang="he-IL" smtClean="0"/>
-              <a:t>כ"ב/ניסן/תשפ"ד</a:t>
+              <a:t>כ"ג/ניסן/תשפ"ד</a:t>
             </a:fld>
             <a:endParaRPr lang="he-IL"/>
           </a:p>
@@ -4393,7 +4393,7 @@
           <a:p>
             <a:fld id="{4144BA53-574F-4A8E-8A29-419EA04C4EA2}" type="datetimeFigureOut">
               <a:rPr lang="he-IL" smtClean="0"/>
-              <a:t>כ"ב/ניסן/תשפ"ד</a:t>
+              <a:t>כ"ג/ניסן/תשפ"ד</a:t>
             </a:fld>
             <a:endParaRPr lang="he-IL"/>
           </a:p>
@@ -4534,7 +4534,7 @@
           <a:p>
             <a:fld id="{4144BA53-574F-4A8E-8A29-419EA04C4EA2}" type="datetimeFigureOut">
               <a:rPr lang="he-IL" smtClean="0"/>
-              <a:t>כ"ב/ניסן/תשפ"ד</a:t>
+              <a:t>כ"ג/ניסן/תשפ"ד</a:t>
             </a:fld>
             <a:endParaRPr lang="he-IL"/>
           </a:p>
@@ -4647,7 +4647,7 @@
           <a:p>
             <a:fld id="{4144BA53-574F-4A8E-8A29-419EA04C4EA2}" type="datetimeFigureOut">
               <a:rPr lang="he-IL" smtClean="0"/>
-              <a:t>כ"ב/ניסן/תשפ"ד</a:t>
+              <a:t>כ"ג/ניסן/תשפ"ד</a:t>
             </a:fld>
             <a:endParaRPr lang="he-IL"/>
           </a:p>
@@ -4958,7 +4958,7 @@
           <a:p>
             <a:fld id="{4144BA53-574F-4A8E-8A29-419EA04C4EA2}" type="datetimeFigureOut">
               <a:rPr lang="he-IL" smtClean="0"/>
-              <a:t>כ"ב/ניסן/תשפ"ד</a:t>
+              <a:t>כ"ג/ניסן/תשפ"ד</a:t>
             </a:fld>
             <a:endParaRPr lang="he-IL"/>
           </a:p>
@@ -5246,7 +5246,7 @@
           <a:p>
             <a:fld id="{4144BA53-574F-4A8E-8A29-419EA04C4EA2}" type="datetimeFigureOut">
               <a:rPr lang="he-IL" smtClean="0"/>
-              <a:t>כ"ב/ניסן/תשפ"ד</a:t>
+              <a:t>כ"ג/ניסן/תשפ"ד</a:t>
             </a:fld>
             <a:endParaRPr lang="he-IL"/>
           </a:p>
@@ -5487,7 +5487,7 @@
           <a:p>
             <a:fld id="{4144BA53-574F-4A8E-8A29-419EA04C4EA2}" type="datetimeFigureOut">
               <a:rPr lang="he-IL" smtClean="0"/>
-              <a:t>כ"ב/ניסן/תשפ"ד</a:t>
+              <a:t>כ"ג/ניסן/תשפ"ד</a:t>
             </a:fld>
             <a:endParaRPr lang="he-IL"/>
           </a:p>
@@ -5997,8 +5997,8 @@
         </p:nvSpPr>
         <p:spPr>
           <a:xfrm>
-            <a:off x="2196446" y="2145983"/>
-            <a:ext cx="7607956" cy="1547432"/>
+            <a:off x="2100753" y="1857821"/>
+            <a:ext cx="7607956" cy="2316874"/>
           </a:xfrm>
           <a:prstGeom prst="rect">
             <a:avLst/>
@@ -6076,6 +6076,19 @@
                 <a:cs typeface="Arial"/>
               </a:rPr>
               <a:t> </a:t>
+            </a:r>
+            <a:br>
+              <a:rPr lang="he-IL" sz="5000" b="1" dirty="0">
+                <a:latin typeface="Arial"/>
+                <a:cs typeface="Arial"/>
+              </a:rPr>
+            </a:br>
+            <a:r>
+              <a:rPr lang="en-US" sz="5000" b="1" dirty="0">
+                <a:latin typeface="Arial"/>
+                <a:cs typeface="Arial"/>
+              </a:rPr>
+              <a:t>B-23-06-R-14</a:t>
             </a:r>
             <a:endParaRPr sz="5000" dirty="0">
               <a:latin typeface="Arial"/>
@@ -6114,7 +6127,7 @@
         </p:nvSpPr>
         <p:spPr>
           <a:xfrm>
-            <a:off x="2792203" y="3914195"/>
+            <a:off x="2768391" y="4174695"/>
             <a:ext cx="6436637" cy="2522058"/>
           </a:xfrm>
           <a:prstGeom prst="rect">

</xml_diff>